<commit_message>
spark learning ppt update
</commit_message>
<xml_diff>
--- a/Spark_学习分享.pptx
+++ b/Spark_学习分享.pptx
@@ -10,9 +10,13 @@
     <p:sldId id="258" r:id="rId4"/>
     <p:sldId id="259" r:id="rId5"/>
     <p:sldId id="260" r:id="rId6"/>
-    <p:sldId id="261" r:id="rId7"/>
-    <p:sldId id="262" r:id="rId8"/>
-    <p:sldId id="263" r:id="rId9"/>
+    <p:sldId id="264" r:id="rId7"/>
+    <p:sldId id="261" r:id="rId8"/>
+    <p:sldId id="262" r:id="rId9"/>
+    <p:sldId id="263" r:id="rId10"/>
+    <p:sldId id="265" r:id="rId11"/>
+    <p:sldId id="267" r:id="rId12"/>
+    <p:sldId id="266" r:id="rId13"/>
   </p:sldIdLst>
   <p:sldSz cx="9144000" cy="6858000" type="screen4x3"/>
   <p:notesSz cx="6858000" cy="9144000"/>
@@ -251,7 +255,7 @@
           <a:p>
             <a:fld id="{A51B94C0-3894-421F-B0A3-450A0BD70801}" type="datetimeFigureOut">
               <a:rPr lang="zh-CN" altLang="en-US" smtClean="0"/>
-              <a:t>2014-4-3</a:t>
+              <a:t>2014-4-4</a:t>
             </a:fld>
             <a:endParaRPr lang="zh-CN" altLang="en-US"/>
           </a:p>
@@ -1120,7 +1124,7 @@
           <a:p>
             <a:fld id="{A51B94C0-3894-421F-B0A3-450A0BD70801}" type="datetimeFigureOut">
               <a:rPr lang="zh-CN" altLang="en-US" smtClean="0"/>
-              <a:t>2014-4-3</a:t>
+              <a:t>2014-4-4</a:t>
             </a:fld>
             <a:endParaRPr lang="zh-CN" altLang="en-US"/>
           </a:p>
@@ -1295,7 +1299,7 @@
           <a:p>
             <a:fld id="{A51B94C0-3894-421F-B0A3-450A0BD70801}" type="datetimeFigureOut">
               <a:rPr lang="zh-CN" altLang="en-US" smtClean="0"/>
-              <a:t>2014-4-3</a:t>
+              <a:t>2014-4-4</a:t>
             </a:fld>
             <a:endParaRPr lang="zh-CN" altLang="en-US"/>
           </a:p>
@@ -1465,7 +1469,7 @@
           <a:p>
             <a:fld id="{A51B94C0-3894-421F-B0A3-450A0BD70801}" type="datetimeFigureOut">
               <a:rPr lang="zh-CN" altLang="en-US" smtClean="0"/>
-              <a:t>2014-4-3</a:t>
+              <a:t>2014-4-4</a:t>
             </a:fld>
             <a:endParaRPr lang="zh-CN" altLang="en-US"/>
           </a:p>
@@ -1675,7 +1679,7 @@
           <a:p>
             <a:fld id="{A51B94C0-3894-421F-B0A3-450A0BD70801}" type="datetimeFigureOut">
               <a:rPr lang="zh-CN" altLang="en-US" smtClean="0"/>
-              <a:t>2014-4-3</a:t>
+              <a:t>2014-4-4</a:t>
             </a:fld>
             <a:endParaRPr lang="zh-CN" altLang="en-US"/>
           </a:p>
@@ -2489,7 +2493,7 @@
           <a:p>
             <a:fld id="{A51B94C0-3894-421F-B0A3-450A0BD70801}" type="datetimeFigureOut">
               <a:rPr lang="zh-CN" altLang="en-US" smtClean="0"/>
-              <a:t>2014-4-3</a:t>
+              <a:t>2014-4-4</a:t>
             </a:fld>
             <a:endParaRPr lang="zh-CN" altLang="en-US"/>
           </a:p>
@@ -2725,7 +2729,7 @@
           <a:p>
             <a:fld id="{A51B94C0-3894-421F-B0A3-450A0BD70801}" type="datetimeFigureOut">
               <a:rPr lang="zh-CN" altLang="en-US" smtClean="0"/>
-              <a:t>2014-4-3</a:t>
+              <a:t>2014-4-4</a:t>
             </a:fld>
             <a:endParaRPr lang="zh-CN" altLang="en-US"/>
           </a:p>
@@ -3048,7 +3052,7 @@
           <a:p>
             <a:fld id="{A51B94C0-3894-421F-B0A3-450A0BD70801}" type="datetimeFigureOut">
               <a:rPr lang="zh-CN" altLang="en-US" smtClean="0"/>
-              <a:t>2014-4-3</a:t>
+              <a:t>2014-4-4</a:t>
             </a:fld>
             <a:endParaRPr lang="zh-CN" altLang="en-US"/>
           </a:p>
@@ -3138,7 +3142,7 @@
           <a:p>
             <a:fld id="{A51B94C0-3894-421F-B0A3-450A0BD70801}" type="datetimeFigureOut">
               <a:rPr lang="zh-CN" altLang="en-US" smtClean="0"/>
-              <a:t>2014-4-3</a:t>
+              <a:t>2014-4-4</a:t>
             </a:fld>
             <a:endParaRPr lang="zh-CN" altLang="en-US"/>
           </a:p>
@@ -3655,7 +3659,7 @@
           <a:p>
             <a:fld id="{A51B94C0-3894-421F-B0A3-450A0BD70801}" type="datetimeFigureOut">
               <a:rPr lang="zh-CN" altLang="en-US" smtClean="0"/>
-              <a:t>2014-4-3</a:t>
+              <a:t>2014-4-4</a:t>
             </a:fld>
             <a:endParaRPr lang="zh-CN" altLang="en-US"/>
           </a:p>
@@ -4166,7 +4170,7 @@
           <a:p>
             <a:fld id="{A51B94C0-3894-421F-B0A3-450A0BD70801}" type="datetimeFigureOut">
               <a:rPr lang="zh-CN" altLang="en-US" smtClean="0"/>
-              <a:t>2014-4-3</a:t>
+              <a:t>2014-4-4</a:t>
             </a:fld>
             <a:endParaRPr lang="zh-CN" altLang="en-US"/>
           </a:p>
@@ -4411,7 +4415,7 @@
           <a:p>
             <a:fld id="{A51B94C0-3894-421F-B0A3-450A0BD70801}" type="datetimeFigureOut">
               <a:rPr lang="zh-CN" altLang="en-US" smtClean="0"/>
-              <a:t>2014-4-3</a:t>
+              <a:t>2014-4-4</a:t>
             </a:fld>
             <a:endParaRPr lang="zh-CN" altLang="en-US"/>
           </a:p>
@@ -5100,6 +5104,577 @@
 </p:sld>
 </file>
 
+<file path=ppt/slides/slide10.xml><?xml version="1.0" encoding="utf-8"?>
+<p:sld xmlns:a="http://schemas.openxmlformats.org/drawingml/2006/main" xmlns:r="http://schemas.openxmlformats.org/officeDocument/2006/relationships" xmlns:p="http://schemas.openxmlformats.org/presentationml/2006/main">
+  <p:cSld>
+    <p:spTree>
+      <p:nvGrpSpPr>
+        <p:cNvPr id="1" name=""/>
+        <p:cNvGrpSpPr/>
+        <p:nvPr/>
+      </p:nvGrpSpPr>
+      <p:grpSpPr>
+        <a:xfrm>
+          <a:off x="0" y="0"/>
+          <a:ext cx="0" cy="0"/>
+          <a:chOff x="0" y="0"/>
+          <a:chExt cx="0" cy="0"/>
+        </a:xfrm>
+      </p:grpSpPr>
+      <p:sp>
+        <p:nvSpPr>
+          <p:cNvPr id="2" name="标题 1"/>
+          <p:cNvSpPr>
+            <a:spLocks noGrp="1"/>
+          </p:cNvSpPr>
+          <p:nvPr>
+            <p:ph type="title"/>
+          </p:nvPr>
+        </p:nvSpPr>
+        <p:spPr/>
+        <p:txBody>
+          <a:bodyPr/>
+          <a:lstStyle/>
+          <a:p>
+            <a:r>
+              <a:rPr lang="en-US" altLang="zh-CN" dirty="0" smtClean="0"/>
+              <a:t>Spark streaming---D-</a:t>
+            </a:r>
+            <a:r>
+              <a:rPr lang="en-US" altLang="zh-CN" dirty="0" err="1" smtClean="0"/>
+              <a:t>Strem</a:t>
+            </a:r>
+            <a:endParaRPr lang="zh-CN" altLang="en-US" dirty="0"/>
+          </a:p>
+        </p:txBody>
+      </p:sp>
+      <p:sp>
+        <p:nvSpPr>
+          <p:cNvPr id="3" name="内容占位符 2"/>
+          <p:cNvSpPr>
+            <a:spLocks noGrp="1"/>
+          </p:cNvSpPr>
+          <p:nvPr>
+            <p:ph sz="quarter" idx="1"/>
+          </p:nvPr>
+        </p:nvSpPr>
+        <p:spPr/>
+        <p:txBody>
+          <a:bodyPr/>
+          <a:lstStyle/>
+          <a:p>
+            <a:r>
+              <a:rPr lang="en-US" altLang="zh-CN" dirty="0" smtClean="0"/>
+              <a:t>Discretized streams: an efficient and fault-tolerant model for stream processing</a:t>
+            </a:r>
+          </a:p>
+          <a:p>
+            <a:r>
+              <a:rPr lang="en-US" altLang="zh-CN" dirty="0" smtClean="0"/>
+              <a:t>Series of deterministic batch computations on small time intervals</a:t>
+            </a:r>
+          </a:p>
+          <a:p>
+            <a:r>
+              <a:rPr lang="en-US" altLang="zh-CN" dirty="0" smtClean="0"/>
+              <a:t>Two types of operators</a:t>
+            </a:r>
+          </a:p>
+          <a:p>
+            <a:pPr marL="457200" indent="-457200">
+              <a:buAutoNum type="alphaLcParenR"/>
+            </a:pPr>
+            <a:r>
+              <a:rPr lang="en-US" altLang="zh-CN" dirty="0" smtClean="0"/>
+              <a:t>Transformation (stateless or </a:t>
+            </a:r>
+            <a:r>
+              <a:rPr lang="en-US" altLang="zh-CN" dirty="0" err="1" smtClean="0"/>
+              <a:t>stateful</a:t>
+            </a:r>
+            <a:r>
+              <a:rPr lang="en-US" altLang="zh-CN" dirty="0" smtClean="0"/>
+              <a:t>)</a:t>
+            </a:r>
+          </a:p>
+          <a:p>
+            <a:pPr marL="457200" indent="-457200">
+              <a:buAutoNum type="alphaLcParenR"/>
+            </a:pPr>
+            <a:r>
+              <a:rPr lang="en-US" altLang="zh-CN" dirty="0" smtClean="0"/>
+              <a:t>Output </a:t>
+            </a:r>
+          </a:p>
+          <a:p>
+            <a:pPr marL="0" indent="0">
+              <a:buNone/>
+            </a:pPr>
+            <a:endParaRPr lang="en-US" altLang="zh-CN" dirty="0"/>
+          </a:p>
+          <a:p>
+            <a:pPr marL="0" indent="0">
+              <a:buNone/>
+            </a:pPr>
+            <a:r>
+              <a:rPr lang="en-US" altLang="zh-CN" dirty="0" smtClean="0"/>
+              <a:t>Reuse all of the operators in Spark</a:t>
+            </a:r>
+            <a:endParaRPr lang="en-US" altLang="zh-CN" dirty="0"/>
+          </a:p>
+        </p:txBody>
+      </p:sp>
+    </p:spTree>
+    <p:extLst>
+      <p:ext uri="{BB962C8B-B14F-4D97-AF65-F5344CB8AC3E}">
+        <p14:creationId xmlns:p14="http://schemas.microsoft.com/office/powerpoint/2010/main" val="3916198495"/>
+      </p:ext>
+    </p:extLst>
+  </p:cSld>
+  <p:clrMapOvr>
+    <a:masterClrMapping/>
+  </p:clrMapOvr>
+  <p:timing>
+    <p:tnLst>
+      <p:par>
+        <p:cTn id="1" dur="indefinite" restart="never" nodeType="tmRoot"/>
+      </p:par>
+    </p:tnLst>
+  </p:timing>
+</p:sld>
+</file>
+
+<file path=ppt/slides/slide11.xml><?xml version="1.0" encoding="utf-8"?>
+<p:sld xmlns:a="http://schemas.openxmlformats.org/drawingml/2006/main" xmlns:r="http://schemas.openxmlformats.org/officeDocument/2006/relationships" xmlns:p="http://schemas.openxmlformats.org/presentationml/2006/main">
+  <p:cSld>
+    <p:spTree>
+      <p:nvGrpSpPr>
+        <p:cNvPr id="1" name=""/>
+        <p:cNvGrpSpPr/>
+        <p:nvPr/>
+      </p:nvGrpSpPr>
+      <p:grpSpPr>
+        <a:xfrm>
+          <a:off x="0" y="0"/>
+          <a:ext cx="0" cy="0"/>
+          <a:chOff x="0" y="0"/>
+          <a:chExt cx="0" cy="0"/>
+        </a:xfrm>
+      </p:grpSpPr>
+      <p:sp>
+        <p:nvSpPr>
+          <p:cNvPr id="2" name="标题 1"/>
+          <p:cNvSpPr>
+            <a:spLocks noGrp="1"/>
+          </p:cNvSpPr>
+          <p:nvPr>
+            <p:ph type="title"/>
+          </p:nvPr>
+        </p:nvSpPr>
+        <p:spPr/>
+        <p:txBody>
+          <a:bodyPr/>
+          <a:lstStyle/>
+          <a:p>
+            <a:r>
+              <a:rPr lang="en-US" altLang="zh-CN" dirty="0" smtClean="0"/>
+              <a:t>Spark streaming --- </a:t>
+            </a:r>
+            <a:r>
+              <a:rPr lang="en-US" altLang="zh-CN" dirty="0" err="1" smtClean="0"/>
+              <a:t>dstream</a:t>
+            </a:r>
+            <a:endParaRPr lang="zh-CN" altLang="en-US" dirty="0"/>
+          </a:p>
+        </p:txBody>
+      </p:sp>
+      <p:sp>
+        <p:nvSpPr>
+          <p:cNvPr id="3" name="内容占位符 2"/>
+          <p:cNvSpPr>
+            <a:spLocks noGrp="1"/>
+          </p:cNvSpPr>
+          <p:nvPr>
+            <p:ph sz="quarter" idx="1"/>
+          </p:nvPr>
+        </p:nvSpPr>
+        <p:spPr/>
+        <p:txBody>
+          <a:bodyPr/>
+          <a:lstStyle/>
+          <a:p>
+            <a:pPr marL="0" indent="0">
+              <a:buNone/>
+            </a:pPr>
+            <a:r>
+              <a:rPr lang="en-US" altLang="zh-CN" dirty="0" err="1" smtClean="0"/>
+              <a:t>pageViews</a:t>
+            </a:r>
+            <a:r>
+              <a:rPr lang="en-US" altLang="zh-CN" dirty="0" smtClean="0"/>
+              <a:t> = </a:t>
+            </a:r>
+            <a:r>
+              <a:rPr lang="en-US" altLang="zh-CN" dirty="0" err="1" smtClean="0"/>
+              <a:t>readStream</a:t>
+            </a:r>
+            <a:r>
+              <a:rPr lang="en-US" altLang="zh-CN" dirty="0" smtClean="0"/>
+              <a:t>(“http://a.com”,  “</a:t>
+            </a:r>
+            <a:r>
+              <a:rPr lang="en-US" altLang="zh-CN" dirty="0" err="1" smtClean="0"/>
+              <a:t>ls</a:t>
+            </a:r>
+            <a:r>
+              <a:rPr lang="en-US" altLang="zh-CN" dirty="0" smtClean="0"/>
+              <a:t>”)</a:t>
+            </a:r>
+          </a:p>
+          <a:p>
+            <a:pPr marL="0" indent="0">
+              <a:buNone/>
+            </a:pPr>
+            <a:r>
+              <a:rPr lang="en-US" altLang="zh-CN" dirty="0" smtClean="0"/>
+              <a:t>ones = </a:t>
+            </a:r>
+            <a:r>
+              <a:rPr lang="en-US" altLang="zh-CN" dirty="0" err="1" smtClean="0"/>
+              <a:t>pageViews.map</a:t>
+            </a:r>
+            <a:r>
+              <a:rPr lang="en-US" altLang="zh-CN" dirty="0" smtClean="0"/>
+              <a:t>(event =&gt; (event.url, 1))</a:t>
+            </a:r>
+          </a:p>
+          <a:p>
+            <a:pPr marL="0" indent="0">
+              <a:buNone/>
+            </a:pPr>
+            <a:r>
+              <a:rPr lang="en-US" altLang="zh-CN" dirty="0" smtClean="0"/>
+              <a:t>Counts = </a:t>
+            </a:r>
+            <a:r>
+              <a:rPr lang="en-US" altLang="zh-CN" dirty="0" err="1" smtClean="0"/>
+              <a:t>ones.runningReduce</a:t>
+            </a:r>
+            <a:r>
+              <a:rPr lang="en-US" altLang="zh-CN" dirty="0" smtClean="0"/>
+              <a:t>((</a:t>
+            </a:r>
+            <a:r>
+              <a:rPr lang="en-US" altLang="zh-CN" dirty="0" err="1" smtClean="0"/>
+              <a:t>a,b</a:t>
+            </a:r>
+            <a:r>
+              <a:rPr lang="en-US" altLang="zh-CN" dirty="0" smtClean="0"/>
+              <a:t>) =&gt; </a:t>
+            </a:r>
+            <a:r>
+              <a:rPr lang="en-US" altLang="zh-CN" dirty="0" err="1" smtClean="0"/>
+              <a:t>a+b</a:t>
+            </a:r>
+            <a:r>
+              <a:rPr lang="en-US" altLang="zh-CN" dirty="0" smtClean="0"/>
+              <a:t>)</a:t>
+            </a:r>
+          </a:p>
+          <a:p>
+            <a:pPr marL="0" indent="0">
+              <a:buNone/>
+            </a:pPr>
+            <a:endParaRPr lang="en-US" altLang="zh-CN" dirty="0"/>
+          </a:p>
+          <a:p>
+            <a:pPr marL="0" indent="0">
+              <a:buNone/>
+            </a:pPr>
+            <a:r>
+              <a:rPr lang="en-US" altLang="zh-CN" dirty="0" err="1" smtClean="0"/>
+              <a:t>Stateful</a:t>
+            </a:r>
+            <a:r>
+              <a:rPr lang="en-US" altLang="zh-CN" dirty="0" smtClean="0"/>
+              <a:t> operators:</a:t>
+            </a:r>
+          </a:p>
+          <a:p>
+            <a:pPr marL="0" indent="0">
+              <a:buNone/>
+            </a:pPr>
+            <a:r>
+              <a:rPr lang="en-US" altLang="zh-CN" dirty="0" smtClean="0"/>
+              <a:t>a) </a:t>
+            </a:r>
+            <a:r>
+              <a:rPr lang="en-US" altLang="zh-CN" dirty="0" err="1" smtClean="0"/>
+              <a:t>Windowding</a:t>
+            </a:r>
+            <a:endParaRPr lang="en-US" altLang="zh-CN" dirty="0" smtClean="0"/>
+          </a:p>
+          <a:p>
+            <a:pPr marL="0" indent="0">
+              <a:buNone/>
+            </a:pPr>
+            <a:r>
+              <a:rPr lang="en-US" altLang="zh-CN" dirty="0" err="1" smtClean="0"/>
+              <a:t>Pairs.window</a:t>
+            </a:r>
+            <a:r>
+              <a:rPr lang="en-US" altLang="zh-CN" dirty="0" smtClean="0"/>
+              <a:t>(“5s”).</a:t>
+            </a:r>
+            <a:r>
+              <a:rPr lang="en-US" altLang="zh-CN" dirty="0" err="1" smtClean="0"/>
+              <a:t>reduceByKey</a:t>
+            </a:r>
+            <a:r>
+              <a:rPr lang="en-US" altLang="zh-CN" dirty="0" smtClean="0"/>
+              <a:t>(_+_)</a:t>
+            </a:r>
+          </a:p>
+          <a:p>
+            <a:pPr marL="0" indent="0">
+              <a:buNone/>
+            </a:pPr>
+            <a:r>
+              <a:rPr lang="en-US" altLang="zh-CN" dirty="0" smtClean="0"/>
+              <a:t>b) Incremental aggregation:</a:t>
+            </a:r>
+          </a:p>
+          <a:p>
+            <a:pPr marL="0" indent="0">
+              <a:buNone/>
+            </a:pPr>
+            <a:r>
+              <a:rPr lang="en-US" altLang="zh-CN" dirty="0" err="1" smtClean="0"/>
+              <a:t>Pairs.reduceByWindow</a:t>
+            </a:r>
+            <a:r>
+              <a:rPr lang="en-US" altLang="zh-CN" dirty="0" smtClean="0"/>
+              <a:t>(“5s”, (</a:t>
+            </a:r>
+            <a:r>
+              <a:rPr lang="en-US" altLang="zh-CN" dirty="0" err="1" smtClean="0"/>
+              <a:t>a,b</a:t>
+            </a:r>
+            <a:r>
+              <a:rPr lang="en-US" altLang="zh-CN" dirty="0" smtClean="0"/>
+              <a:t>)=&gt;</a:t>
+            </a:r>
+            <a:r>
+              <a:rPr lang="en-US" altLang="zh-CN" dirty="0" err="1" smtClean="0"/>
+              <a:t>a+b</a:t>
+            </a:r>
+            <a:r>
+              <a:rPr lang="en-US" altLang="zh-CN" dirty="0" smtClean="0"/>
+              <a:t>)</a:t>
+            </a:r>
+          </a:p>
+          <a:p>
+            <a:pPr marL="0" indent="0">
+              <a:buNone/>
+            </a:pPr>
+            <a:r>
+              <a:rPr lang="en-US" altLang="zh-CN" dirty="0" smtClean="0"/>
+              <a:t>c) </a:t>
+            </a:r>
+            <a:r>
+              <a:rPr lang="en-US" altLang="zh-CN" dirty="0"/>
+              <a:t>T</a:t>
+            </a:r>
+            <a:r>
+              <a:rPr lang="en-US" altLang="zh-CN" dirty="0" smtClean="0"/>
+              <a:t>ime-skewed joins</a:t>
+            </a:r>
+          </a:p>
+          <a:p>
+            <a:pPr marL="0" indent="0">
+              <a:buNone/>
+            </a:pPr>
+            <a:endParaRPr lang="en-US" altLang="zh-CN" dirty="0" smtClean="0"/>
+          </a:p>
+          <a:p>
+            <a:pPr marL="0" indent="0">
+              <a:buNone/>
+            </a:pPr>
+            <a:endParaRPr lang="en-US" altLang="zh-CN" dirty="0" smtClean="0"/>
+          </a:p>
+          <a:p>
+            <a:endParaRPr lang="en-US" altLang="zh-CN" dirty="0" smtClean="0"/>
+          </a:p>
+          <a:p>
+            <a:endParaRPr lang="en-US" altLang="zh-CN" dirty="0" smtClean="0"/>
+          </a:p>
+          <a:p>
+            <a:endParaRPr lang="zh-CN" altLang="en-US" dirty="0"/>
+          </a:p>
+        </p:txBody>
+      </p:sp>
+    </p:spTree>
+    <p:extLst>
+      <p:ext uri="{BB962C8B-B14F-4D97-AF65-F5344CB8AC3E}">
+        <p14:creationId xmlns:p14="http://schemas.microsoft.com/office/powerpoint/2010/main" val="121755027"/>
+      </p:ext>
+    </p:extLst>
+  </p:cSld>
+  <p:clrMapOvr>
+    <a:masterClrMapping/>
+  </p:clrMapOvr>
+  <p:timing>
+    <p:tnLst>
+      <p:par>
+        <p:cTn id="1" dur="indefinite" restart="never" nodeType="tmRoot"/>
+      </p:par>
+    </p:tnLst>
+  </p:timing>
+</p:sld>
+</file>
+
+<file path=ppt/slides/slide12.xml><?xml version="1.0" encoding="utf-8"?>
+<p:sld xmlns:a="http://schemas.openxmlformats.org/drawingml/2006/main" xmlns:r="http://schemas.openxmlformats.org/officeDocument/2006/relationships" xmlns:p="http://schemas.openxmlformats.org/presentationml/2006/main">
+  <p:cSld>
+    <p:spTree>
+      <p:nvGrpSpPr>
+        <p:cNvPr id="1" name=""/>
+        <p:cNvGrpSpPr/>
+        <p:nvPr/>
+      </p:nvGrpSpPr>
+      <p:grpSpPr>
+        <a:xfrm>
+          <a:off x="0" y="0"/>
+          <a:ext cx="0" cy="0"/>
+          <a:chOff x="0" y="0"/>
+          <a:chExt cx="0" cy="0"/>
+        </a:xfrm>
+      </p:grpSpPr>
+      <p:sp>
+        <p:nvSpPr>
+          <p:cNvPr id="2" name="标题 1"/>
+          <p:cNvSpPr>
+            <a:spLocks noGrp="1"/>
+          </p:cNvSpPr>
+          <p:nvPr>
+            <p:ph type="title"/>
+          </p:nvPr>
+        </p:nvSpPr>
+        <p:spPr/>
+        <p:txBody>
+          <a:bodyPr/>
+          <a:lstStyle/>
+          <a:p>
+            <a:r>
+              <a:rPr lang="en-US" altLang="zh-CN" dirty="0" smtClean="0"/>
+              <a:t>Spark stream -- </a:t>
+            </a:r>
+            <a:r>
+              <a:rPr lang="en-US" altLang="zh-CN" dirty="0" err="1" smtClean="0"/>
+              <a:t>dstream</a:t>
+            </a:r>
+            <a:endParaRPr lang="zh-CN" altLang="en-US" dirty="0"/>
+          </a:p>
+        </p:txBody>
+      </p:sp>
+      <p:sp>
+        <p:nvSpPr>
+          <p:cNvPr id="3" name="内容占位符 2"/>
+          <p:cNvSpPr>
+            <a:spLocks noGrp="1"/>
+          </p:cNvSpPr>
+          <p:nvPr>
+            <p:ph sz="quarter" idx="1"/>
+          </p:nvPr>
+        </p:nvSpPr>
+        <p:spPr/>
+        <p:txBody>
+          <a:bodyPr/>
+          <a:lstStyle/>
+          <a:p>
+            <a:pPr marL="0" indent="0">
+              <a:buNone/>
+            </a:pPr>
+            <a:r>
+              <a:rPr lang="en-US" altLang="zh-CN" dirty="0" smtClean="0"/>
+              <a:t>Fault </a:t>
+            </a:r>
+            <a:r>
+              <a:rPr lang="en-US" altLang="zh-CN" dirty="0"/>
+              <a:t>tolerance, </a:t>
+            </a:r>
+          </a:p>
+          <a:p>
+            <a:pPr marL="457200" indent="-457200">
+              <a:buAutoNum type="alphaLcParenR"/>
+            </a:pPr>
+            <a:r>
+              <a:rPr lang="en-US" altLang="zh-CN" dirty="0" smtClean="0"/>
+              <a:t>Replication (not cost-effective)</a:t>
+            </a:r>
+            <a:endParaRPr lang="en-US" altLang="zh-CN" dirty="0"/>
+          </a:p>
+          <a:p>
+            <a:pPr marL="457200" indent="-457200">
+              <a:buAutoNum type="alphaLcParenR"/>
+            </a:pPr>
+            <a:r>
+              <a:rPr lang="en-US" altLang="zh-CN" dirty="0"/>
+              <a:t>Upstream </a:t>
+            </a:r>
+            <a:r>
+              <a:rPr lang="en-US" altLang="zh-CN" dirty="0" smtClean="0"/>
+              <a:t>backup (long recovery time)</a:t>
+            </a:r>
+            <a:endParaRPr lang="en-US" altLang="zh-CN" dirty="0"/>
+          </a:p>
+          <a:p>
+            <a:pPr marL="457200" indent="-457200">
+              <a:buAutoNum type="alphaLcParenR"/>
+            </a:pPr>
+            <a:r>
+              <a:rPr lang="en-US" altLang="zh-CN" dirty="0"/>
+              <a:t>Parallel </a:t>
+            </a:r>
+            <a:r>
+              <a:rPr lang="en-US" altLang="zh-CN" dirty="0" smtClean="0"/>
+              <a:t>recover (D-stream method)</a:t>
+            </a:r>
+          </a:p>
+          <a:p>
+            <a:pPr marL="0" indent="0">
+              <a:buNone/>
+            </a:pPr>
+            <a:endParaRPr lang="en-US" altLang="zh-CN" dirty="0"/>
+          </a:p>
+          <a:p>
+            <a:r>
+              <a:rPr lang="en-US" altLang="zh-CN" dirty="0" smtClean="0"/>
+              <a:t>Periodically checkpoints some of the state RDDs</a:t>
+            </a:r>
+          </a:p>
+          <a:p>
+            <a:r>
+              <a:rPr lang="en-US" altLang="zh-CN" dirty="0" smtClean="0"/>
+              <a:t>Deterministic transformations at the coarse granularity of RDD partitions</a:t>
+            </a:r>
+            <a:endParaRPr lang="zh-CN" altLang="en-US" dirty="0"/>
+          </a:p>
+        </p:txBody>
+      </p:sp>
+    </p:spTree>
+    <p:extLst>
+      <p:ext uri="{BB962C8B-B14F-4D97-AF65-F5344CB8AC3E}">
+        <p14:creationId xmlns:p14="http://schemas.microsoft.com/office/powerpoint/2010/main" val="2813716129"/>
+      </p:ext>
+    </p:extLst>
+  </p:cSld>
+  <p:clrMapOvr>
+    <a:masterClrMapping/>
+  </p:clrMapOvr>
+</p:sld>
+</file>
+
 <file path=ppt/slides/slide2.xml><?xml version="1.0" encoding="utf-8"?>
 <p:sld xmlns:a="http://schemas.openxmlformats.org/drawingml/2006/main" xmlns:r="http://schemas.openxmlformats.org/officeDocument/2006/relationships" xmlns:p="http://schemas.openxmlformats.org/presentationml/2006/main">
   <p:cSld>
@@ -5780,18 +6355,16 @@
           <a:bodyPr/>
           <a:lstStyle/>
           <a:p>
-            <a:r>
-              <a:rPr lang="en-US" altLang="zh-CN" dirty="0" smtClean="0"/>
-              <a:t>Two type of dependencies: </a:t>
-            </a:r>
-          </a:p>
-          <a:p>
             <a:pPr marL="0" indent="0">
               <a:buNone/>
             </a:pPr>
             <a:r>
-              <a:rPr lang="en-US" altLang="zh-CN" dirty="0" smtClean="0"/>
-              <a:t>a) Narrow dependencies</a:t>
+              <a:rPr lang="en-US" altLang="zh-CN" dirty="0" err="1" smtClean="0"/>
+              <a:t>Abstrct</a:t>
+            </a:r>
+            <a:r>
+              <a:rPr lang="en-US" altLang="zh-CN" dirty="0" smtClean="0"/>
+              <a:t> class RDD </a:t>
             </a:r>
           </a:p>
           <a:p>
@@ -5799,9 +6372,10 @@
               <a:buNone/>
             </a:pPr>
             <a:r>
-              <a:rPr lang="en-US" altLang="zh-CN" dirty="0" smtClean="0"/>
-              <a:t>Each partition depends on a constant number of partitions of the parent</a:t>
-            </a:r>
+              <a:rPr lang="en-US" altLang="zh-CN" dirty="0" err="1" smtClean="0"/>
+              <a:t>MappedRDD</a:t>
+            </a:r>
+            <a:endParaRPr lang="en-US" altLang="zh-CN" dirty="0" smtClean="0"/>
           </a:p>
           <a:p>
             <a:pPr marL="0" indent="0">
@@ -5809,47 +6383,41 @@
             </a:pPr>
             <a:r>
               <a:rPr lang="en-US" altLang="zh-CN" dirty="0" smtClean="0"/>
-              <a:t>e.g. map, filter </a:t>
+              <a:t>override </a:t>
+            </a:r>
+            <a:r>
+              <a:rPr lang="en-US" altLang="zh-CN" dirty="0" err="1" smtClean="0"/>
+              <a:t>def</a:t>
+            </a:r>
+            <a:r>
+              <a:rPr lang="en-US" altLang="zh-CN" dirty="0" smtClean="0"/>
+              <a:t> compute(split: Partition, context: </a:t>
+            </a:r>
+            <a:r>
+              <a:rPr lang="en-US" altLang="zh-CN" dirty="0" err="1" smtClean="0"/>
+              <a:t>TaskContext</a:t>
+            </a:r>
+            <a:r>
+              <a:rPr lang="en-US" altLang="zh-CN" dirty="0" smtClean="0"/>
+              <a:t>) </a:t>
             </a:r>
           </a:p>
           <a:p>
             <a:pPr marL="0" indent="0">
               <a:buNone/>
             </a:pPr>
-            <a:endParaRPr lang="en-US" altLang="zh-CN" dirty="0"/>
-          </a:p>
-          <a:p>
-            <a:pPr marL="0" indent="0">
-              <a:buNone/>
-            </a:pPr>
-            <a:r>
-              <a:rPr lang="en-US" altLang="zh-CN" dirty="0" smtClean="0"/>
-              <a:t>b) Wide dependencies</a:t>
-            </a:r>
-          </a:p>
-          <a:p>
-            <a:pPr marL="0" indent="0">
-              <a:buNone/>
-            </a:pPr>
-            <a:r>
-              <a:rPr lang="en-US" altLang="zh-CN" dirty="0" smtClean="0"/>
-              <a:t>Each partition of the child can depend on data from all partitions of the parent</a:t>
-            </a:r>
-          </a:p>
-          <a:p>
-            <a:pPr marL="0" indent="0">
-              <a:buNone/>
-            </a:pPr>
-            <a:r>
-              <a:rPr lang="en-US" altLang="zh-CN" dirty="0" smtClean="0"/>
-              <a:t>e.g. join ( parent not hash-partitioned)</a:t>
-            </a:r>
-          </a:p>
-          <a:p>
-            <a:pPr marL="0" indent="0">
-              <a:buNone/>
-            </a:pPr>
-            <a:endParaRPr lang="en-US" altLang="zh-CN" dirty="0"/>
+            <a:r>
+              <a:rPr lang="en-US" altLang="zh-CN" dirty="0" smtClean="0"/>
+              <a:t>=  </a:t>
+            </a:r>
+            <a:r>
+              <a:rPr lang="en-US" altLang="zh-CN" dirty="0" err="1" smtClean="0"/>
+              <a:t>firstParent</a:t>
+            </a:r>
+            <a:r>
+              <a:rPr lang="en-US" altLang="zh-CN" dirty="0" smtClean="0"/>
+              <a:t>[T].iterator(split, context).map(f)</a:t>
+            </a:r>
           </a:p>
           <a:p>
             <a:pPr marL="0" indent="0">
@@ -5857,12 +6425,71 @@
             </a:pPr>
             <a:endParaRPr lang="en-US" altLang="zh-CN" dirty="0" smtClean="0"/>
           </a:p>
+          <a:p>
+            <a:pPr marL="0" indent="0">
+              <a:buNone/>
+            </a:pPr>
+            <a:r>
+              <a:rPr lang="en-US" altLang="zh-CN" dirty="0" err="1" smtClean="0"/>
+              <a:t>FilteredRDD</a:t>
+            </a:r>
+            <a:endParaRPr lang="en-US" altLang="zh-CN" dirty="0" smtClean="0"/>
+          </a:p>
+          <a:p>
+            <a:pPr marL="0" indent="0">
+              <a:buNone/>
+            </a:pPr>
+            <a:r>
+              <a:rPr lang="en-US" altLang="zh-CN" dirty="0" smtClean="0"/>
+              <a:t>override </a:t>
+            </a:r>
+            <a:r>
+              <a:rPr lang="en-US" altLang="zh-CN" dirty="0" err="1" smtClean="0"/>
+              <a:t>def</a:t>
+            </a:r>
+            <a:r>
+              <a:rPr lang="en-US" altLang="zh-CN" dirty="0" smtClean="0"/>
+              <a:t> compute(split: Partition, context: </a:t>
+            </a:r>
+            <a:r>
+              <a:rPr lang="en-US" altLang="zh-CN" dirty="0" err="1" smtClean="0"/>
+              <a:t>TaskContext</a:t>
+            </a:r>
+            <a:r>
+              <a:rPr lang="en-US" altLang="zh-CN" dirty="0" smtClean="0"/>
+              <a:t>)</a:t>
+            </a:r>
+          </a:p>
+          <a:p>
+            <a:pPr marL="0" indent="0">
+              <a:buNone/>
+            </a:pPr>
+            <a:r>
+              <a:rPr lang="en-US" altLang="zh-CN" dirty="0" smtClean="0"/>
+              <a:t>= </a:t>
+            </a:r>
+            <a:r>
+              <a:rPr lang="en-US" altLang="zh-CN" dirty="0" err="1" smtClean="0"/>
+              <a:t>firstParent</a:t>
+            </a:r>
+            <a:r>
+              <a:rPr lang="en-US" altLang="zh-CN" dirty="0" smtClean="0"/>
+              <a:t>[T].iterator(split, context).filter(f)</a:t>
+            </a:r>
+            <a:endParaRPr lang="en-US" altLang="zh-CN" dirty="0"/>
+          </a:p>
+          <a:p>
+            <a:endParaRPr lang="en-US" altLang="zh-CN" dirty="0" smtClean="0"/>
+          </a:p>
+          <a:p>
+            <a:endParaRPr lang="zh-CN" altLang="en-US" dirty="0"/>
+          </a:p>
         </p:txBody>
       </p:sp>
     </p:spTree>
     <p:extLst>
       <p:ext uri="{BB962C8B-B14F-4D97-AF65-F5344CB8AC3E}">
-        <p14:creationId xmlns:p14="http://schemas.microsoft.com/office/powerpoint/2010/main" val="1153043406"/>
+        <p14:creationId xmlns:p14="http://schemas.microsoft.com/office/powerpoint/2010/main" val="417172266"/>
       </p:ext>
     </p:extLst>
   </p:cSld>
@@ -5919,10 +6546,6 @@
               <a:rPr lang="en-US" altLang="zh-CN" dirty="0" err="1" smtClean="0"/>
               <a:t>rdd</a:t>
             </a:r>
-            <a:r>
-              <a:rPr lang="en-US" altLang="zh-CN" dirty="0" smtClean="0"/>
-              <a:t> scheduler</a:t>
-            </a:r>
             <a:endParaRPr lang="zh-CN" altLang="en-US" dirty="0"/>
           </a:p>
         </p:txBody>
@@ -5944,30 +6567,87 @@
           <a:p>
             <a:r>
               <a:rPr lang="en-US" altLang="zh-CN" dirty="0" smtClean="0"/>
-              <a:t>Build a DAG of stages to execute </a:t>
-            </a:r>
-          </a:p>
-          <a:p>
-            <a:r>
-              <a:rPr lang="en-US" altLang="zh-CN" dirty="0" smtClean="0"/>
-              <a:t>Stage contains as many pipelined transformations with narrow dependencies as possible</a:t>
-            </a:r>
-          </a:p>
-          <a:p>
-            <a:r>
-              <a:rPr lang="en-US" altLang="zh-CN" dirty="0" smtClean="0"/>
-              <a:t>Boundary of the stages are the shuffle operations required for wide dependencies ore cached partitions</a:t>
-            </a:r>
-          </a:p>
-          <a:p>
-            <a:endParaRPr lang="zh-CN" altLang="en-US" dirty="0"/>
+              <a:t>Two type of dependencies: </a:t>
+            </a:r>
+          </a:p>
+          <a:p>
+            <a:pPr marL="0" indent="0">
+              <a:buNone/>
+            </a:pPr>
+            <a:r>
+              <a:rPr lang="en-US" altLang="zh-CN" dirty="0" smtClean="0"/>
+              <a:t>a) Narrow dependencies</a:t>
+            </a:r>
+          </a:p>
+          <a:p>
+            <a:pPr marL="0" indent="0">
+              <a:buNone/>
+            </a:pPr>
+            <a:r>
+              <a:rPr lang="en-US" altLang="zh-CN" dirty="0" smtClean="0"/>
+              <a:t>Each partition depends on a constant number of partitions of the parent</a:t>
+            </a:r>
+          </a:p>
+          <a:p>
+            <a:pPr marL="0" indent="0">
+              <a:buNone/>
+            </a:pPr>
+            <a:r>
+              <a:rPr lang="en-US" altLang="zh-CN" dirty="0" smtClean="0"/>
+              <a:t>e.g. map, filter </a:t>
+            </a:r>
+          </a:p>
+          <a:p>
+            <a:pPr marL="0" indent="0">
+              <a:buNone/>
+            </a:pPr>
+            <a:endParaRPr lang="en-US" altLang="zh-CN" dirty="0"/>
+          </a:p>
+          <a:p>
+            <a:pPr marL="0" indent="0">
+              <a:buNone/>
+            </a:pPr>
+            <a:r>
+              <a:rPr lang="en-US" altLang="zh-CN" dirty="0" smtClean="0"/>
+              <a:t>b) Wide dependencies</a:t>
+            </a:r>
+          </a:p>
+          <a:p>
+            <a:pPr marL="0" indent="0">
+              <a:buNone/>
+            </a:pPr>
+            <a:r>
+              <a:rPr lang="en-US" altLang="zh-CN" dirty="0" smtClean="0"/>
+              <a:t>Each partition of the child can depend on data from all partitions of the parent</a:t>
+            </a:r>
+          </a:p>
+          <a:p>
+            <a:pPr marL="0" indent="0">
+              <a:buNone/>
+            </a:pPr>
+            <a:r>
+              <a:rPr lang="en-US" altLang="zh-CN" dirty="0" smtClean="0"/>
+              <a:t>e.g. join ( parent not hash-partitioned)</a:t>
+            </a:r>
+          </a:p>
+          <a:p>
+            <a:pPr marL="0" indent="0">
+              <a:buNone/>
+            </a:pPr>
+            <a:endParaRPr lang="en-US" altLang="zh-CN" dirty="0"/>
+          </a:p>
+          <a:p>
+            <a:pPr marL="0" indent="0">
+              <a:buNone/>
+            </a:pPr>
+            <a:endParaRPr lang="en-US" altLang="zh-CN" dirty="0" smtClean="0"/>
           </a:p>
         </p:txBody>
       </p:sp>
     </p:spTree>
     <p:extLst>
       <p:ext uri="{BB962C8B-B14F-4D97-AF65-F5344CB8AC3E}">
-        <p14:creationId xmlns:p14="http://schemas.microsoft.com/office/powerpoint/2010/main" val="2780575731"/>
+        <p14:creationId xmlns:p14="http://schemas.microsoft.com/office/powerpoint/2010/main" val="1153043406"/>
       </p:ext>
     </p:extLst>
   </p:cSld>
@@ -6024,6 +6704,10 @@
               <a:rPr lang="en-US" altLang="zh-CN" dirty="0" err="1" smtClean="0"/>
               <a:t>rdd</a:t>
             </a:r>
+            <a:r>
+              <a:rPr lang="en-US" altLang="zh-CN" dirty="0" smtClean="0"/>
+              <a:t> scheduler</a:t>
+            </a:r>
             <a:endParaRPr lang="zh-CN" altLang="en-US" dirty="0"/>
           </a:p>
         </p:txBody>
@@ -6039,6 +6723,129 @@
           </p:nvPr>
         </p:nvSpPr>
         <p:spPr/>
+        <p:txBody>
+          <a:bodyPr/>
+          <a:lstStyle/>
+          <a:p>
+            <a:r>
+              <a:rPr lang="en-US" altLang="zh-CN" dirty="0" smtClean="0"/>
+              <a:t>Build a DAG of stages to execute </a:t>
+            </a:r>
+          </a:p>
+          <a:p>
+            <a:r>
+              <a:rPr lang="en-US" altLang="zh-CN" dirty="0" smtClean="0"/>
+              <a:t>Stage contains as many pipelined transformations with narrow dependencies as possible</a:t>
+            </a:r>
+          </a:p>
+          <a:p>
+            <a:r>
+              <a:rPr lang="en-US" altLang="zh-CN" dirty="0" smtClean="0"/>
+              <a:t>Boundary of the stages are the shuffle operations required for wide dependencies ore cached </a:t>
+            </a:r>
+            <a:r>
+              <a:rPr lang="en-US" altLang="zh-CN" dirty="0" smtClean="0"/>
+              <a:t>partitions</a:t>
+            </a:r>
+          </a:p>
+          <a:p>
+            <a:r>
+              <a:rPr lang="en-US" altLang="zh-CN" dirty="0" err="1" smtClean="0"/>
+              <a:t>Checkpointing</a:t>
+            </a:r>
+            <a:r>
+              <a:rPr lang="en-US" altLang="zh-CN" dirty="0" smtClean="0"/>
+              <a:t> RDD with long lineage graphs of wide dependencies</a:t>
+            </a:r>
+          </a:p>
+          <a:p>
+            <a:endParaRPr lang="en-US" altLang="zh-CN" dirty="0" smtClean="0"/>
+          </a:p>
+          <a:p>
+            <a:endParaRPr lang="zh-CN" altLang="en-US" dirty="0"/>
+          </a:p>
+        </p:txBody>
+      </p:sp>
+    </p:spTree>
+    <p:extLst>
+      <p:ext uri="{BB962C8B-B14F-4D97-AF65-F5344CB8AC3E}">
+        <p14:creationId xmlns:p14="http://schemas.microsoft.com/office/powerpoint/2010/main" val="2780575731"/>
+      </p:ext>
+    </p:extLst>
+  </p:cSld>
+  <p:clrMapOvr>
+    <a:masterClrMapping/>
+  </p:clrMapOvr>
+  <p:timing>
+    <p:tnLst>
+      <p:par>
+        <p:cTn id="1" dur="indefinite" restart="never" nodeType="tmRoot"/>
+      </p:par>
+    </p:tnLst>
+  </p:timing>
+</p:sld>
+</file>
+
+<file path=ppt/slides/slide9.xml><?xml version="1.0" encoding="utf-8"?>
+<p:sld xmlns:a="http://schemas.openxmlformats.org/drawingml/2006/main" xmlns:r="http://schemas.openxmlformats.org/officeDocument/2006/relationships" xmlns:p="http://schemas.openxmlformats.org/presentationml/2006/main">
+  <p:cSld>
+    <p:spTree>
+      <p:nvGrpSpPr>
+        <p:cNvPr id="1" name=""/>
+        <p:cNvGrpSpPr/>
+        <p:nvPr/>
+      </p:nvGrpSpPr>
+      <p:grpSpPr>
+        <a:xfrm>
+          <a:off x="0" y="0"/>
+          <a:ext cx="0" cy="0"/>
+          <a:chOff x="0" y="0"/>
+          <a:chExt cx="0" cy="0"/>
+        </a:xfrm>
+      </p:grpSpPr>
+      <p:sp>
+        <p:nvSpPr>
+          <p:cNvPr id="2" name="标题 1"/>
+          <p:cNvSpPr>
+            <a:spLocks noGrp="1"/>
+          </p:cNvSpPr>
+          <p:nvPr>
+            <p:ph type="title"/>
+          </p:nvPr>
+        </p:nvSpPr>
+        <p:spPr/>
+        <p:txBody>
+          <a:bodyPr/>
+          <a:lstStyle/>
+          <a:p>
+            <a:r>
+              <a:rPr lang="en-US" altLang="zh-CN" dirty="0" smtClean="0"/>
+              <a:t>Spark </a:t>
+            </a:r>
+            <a:r>
+              <a:rPr lang="en-US" altLang="zh-CN" dirty="0" err="1" smtClean="0"/>
+              <a:t>rdd</a:t>
+            </a:r>
+            <a:endParaRPr lang="zh-CN" altLang="en-US" dirty="0"/>
+          </a:p>
+        </p:txBody>
+      </p:sp>
+      <p:sp>
+        <p:nvSpPr>
+          <p:cNvPr id="3" name="内容占位符 2"/>
+          <p:cNvSpPr>
+            <a:spLocks noGrp="1"/>
+          </p:cNvSpPr>
+          <p:nvPr>
+            <p:ph sz="quarter" idx="1"/>
+          </p:nvPr>
+        </p:nvSpPr>
+        <p:spPr>
+          <a:xfrm>
+            <a:off x="457200" y="1600200"/>
+            <a:ext cx="7501096" cy="4873752"/>
+          </a:xfrm>
+        </p:spPr>
         <p:txBody>
           <a:bodyPr/>
           <a:lstStyle/>
@@ -8494,6 +9301,247 @@
             <a:r>
               <a:rPr lang="en-US" altLang="zh-CN" dirty="0" smtClean="0"/>
               <a:t>join</a:t>
+            </a:r>
+            <a:endParaRPr lang="zh-CN" altLang="en-US" dirty="0"/>
+          </a:p>
+        </p:txBody>
+      </p:sp>
+      <p:sp>
+        <p:nvSpPr>
+          <p:cNvPr id="10" name="圆角矩形 9"/>
+          <p:cNvSpPr/>
+          <p:nvPr/>
+        </p:nvSpPr>
+        <p:spPr>
+          <a:xfrm>
+            <a:off x="112391" y="1509844"/>
+            <a:ext cx="2906746" cy="2054116"/>
+          </a:xfrm>
+          <a:prstGeom prst="roundRect">
+            <a:avLst/>
+          </a:prstGeom>
+          <a:solidFill>
+            <a:schemeClr val="accent1">
+              <a:alpha val="0"/>
+            </a:schemeClr>
+          </a:solidFill>
+          <a:ln cmpd="dbl">
+            <a:solidFill>
+              <a:schemeClr val="accent1">
+                <a:shade val="50000"/>
+              </a:schemeClr>
+            </a:solidFill>
+          </a:ln>
+        </p:spPr>
+        <p:style>
+          <a:lnRef idx="2">
+            <a:schemeClr val="accent1">
+              <a:shade val="50000"/>
+            </a:schemeClr>
+          </a:lnRef>
+          <a:fillRef idx="1">
+            <a:schemeClr val="accent1"/>
+          </a:fillRef>
+          <a:effectRef idx="0">
+            <a:schemeClr val="accent1"/>
+          </a:effectRef>
+          <a:fontRef idx="minor">
+            <a:schemeClr val="lt1"/>
+          </a:fontRef>
+        </p:style>
+        <p:txBody>
+          <a:bodyPr rtlCol="0" anchor="ctr"/>
+          <a:lstStyle/>
+          <a:p>
+            <a:pPr algn="ctr"/>
+            <a:endParaRPr lang="zh-CN" altLang="en-US"/>
+          </a:p>
+        </p:txBody>
+      </p:sp>
+      <p:sp>
+        <p:nvSpPr>
+          <p:cNvPr id="15" name="圆角矩形 14"/>
+          <p:cNvSpPr/>
+          <p:nvPr/>
+        </p:nvSpPr>
+        <p:spPr>
+          <a:xfrm>
+            <a:off x="112391" y="3654316"/>
+            <a:ext cx="5179689" cy="2819636"/>
+          </a:xfrm>
+          <a:prstGeom prst="roundRect">
+            <a:avLst/>
+          </a:prstGeom>
+          <a:solidFill>
+            <a:schemeClr val="accent1">
+              <a:alpha val="0"/>
+            </a:schemeClr>
+          </a:solidFill>
+          <a:ln w="12700"/>
+        </p:spPr>
+        <p:style>
+          <a:lnRef idx="2">
+            <a:schemeClr val="accent1">
+              <a:shade val="50000"/>
+            </a:schemeClr>
+          </a:lnRef>
+          <a:fillRef idx="1">
+            <a:schemeClr val="accent1"/>
+          </a:fillRef>
+          <a:effectRef idx="0">
+            <a:schemeClr val="accent1"/>
+          </a:effectRef>
+          <a:fontRef idx="minor">
+            <a:schemeClr val="lt1"/>
+          </a:fontRef>
+        </p:style>
+        <p:txBody>
+          <a:bodyPr rtlCol="0" anchor="ctr"/>
+          <a:lstStyle/>
+          <a:p>
+            <a:pPr algn="ctr"/>
+            <a:endParaRPr lang="zh-CN" altLang="en-US"/>
+          </a:p>
+        </p:txBody>
+      </p:sp>
+      <p:sp>
+        <p:nvSpPr>
+          <p:cNvPr id="18" name="圆角矩形 17"/>
+          <p:cNvSpPr/>
+          <p:nvPr/>
+        </p:nvSpPr>
+        <p:spPr>
+          <a:xfrm>
+            <a:off x="0" y="1340768"/>
+            <a:ext cx="8028384" cy="5328592"/>
+          </a:xfrm>
+          <a:prstGeom prst="roundRect">
+            <a:avLst/>
+          </a:prstGeom>
+          <a:solidFill>
+            <a:schemeClr val="accent1">
+              <a:alpha val="0"/>
+            </a:schemeClr>
+          </a:solidFill>
+          <a:ln w="22225">
+            <a:solidFill>
+              <a:schemeClr val="accent1">
+                <a:shade val="50000"/>
+                <a:alpha val="56000"/>
+              </a:schemeClr>
+            </a:solidFill>
+          </a:ln>
+        </p:spPr>
+        <p:style>
+          <a:lnRef idx="2">
+            <a:schemeClr val="accent1">
+              <a:shade val="50000"/>
+            </a:schemeClr>
+          </a:lnRef>
+          <a:fillRef idx="1">
+            <a:schemeClr val="accent1"/>
+          </a:fillRef>
+          <a:effectRef idx="0">
+            <a:schemeClr val="accent1"/>
+          </a:effectRef>
+          <a:fontRef idx="minor">
+            <a:schemeClr val="lt1"/>
+          </a:fontRef>
+        </p:style>
+        <p:txBody>
+          <a:bodyPr rtlCol="0" anchor="ctr"/>
+          <a:lstStyle/>
+          <a:p>
+            <a:pPr algn="ctr"/>
+            <a:endParaRPr lang="zh-CN" altLang="en-US"/>
+          </a:p>
+        </p:txBody>
+      </p:sp>
+      <p:sp>
+        <p:nvSpPr>
+          <p:cNvPr id="19" name="TextBox 18"/>
+          <p:cNvSpPr txBox="1"/>
+          <p:nvPr/>
+        </p:nvSpPr>
+        <p:spPr>
+          <a:xfrm>
+            <a:off x="251520" y="2770929"/>
+            <a:ext cx="1008112" cy="369332"/>
+          </a:xfrm>
+          <a:prstGeom prst="rect">
+            <a:avLst/>
+          </a:prstGeom>
+          <a:noFill/>
+        </p:spPr>
+        <p:txBody>
+          <a:bodyPr wrap="square" rtlCol="0">
+            <a:spAutoFit/>
+          </a:bodyPr>
+          <a:lstStyle/>
+          <a:p>
+            <a:r>
+              <a:rPr lang="en-US" altLang="zh-CN" dirty="0" smtClean="0"/>
+              <a:t>stage1</a:t>
+            </a:r>
+            <a:endParaRPr lang="zh-CN" altLang="en-US" dirty="0"/>
+          </a:p>
+        </p:txBody>
+      </p:sp>
+      <p:sp>
+        <p:nvSpPr>
+          <p:cNvPr id="20" name="TextBox 19"/>
+          <p:cNvSpPr txBox="1"/>
+          <p:nvPr/>
+        </p:nvSpPr>
+        <p:spPr>
+          <a:xfrm>
+            <a:off x="423704" y="5531391"/>
+            <a:ext cx="1151344" cy="367705"/>
+          </a:xfrm>
+          <a:prstGeom prst="rect">
+            <a:avLst/>
+          </a:prstGeom>
+          <a:noFill/>
+        </p:spPr>
+        <p:txBody>
+          <a:bodyPr wrap="square" rtlCol="0">
+            <a:spAutoFit/>
+          </a:bodyPr>
+          <a:lstStyle/>
+          <a:p>
+            <a:r>
+              <a:rPr lang="en-US" altLang="zh-CN" dirty="0" smtClean="0"/>
+              <a:t>stage2</a:t>
+            </a:r>
+            <a:endParaRPr lang="zh-CN" altLang="en-US" dirty="0"/>
+          </a:p>
+        </p:txBody>
+      </p:sp>
+      <p:sp>
+        <p:nvSpPr>
+          <p:cNvPr id="21" name="TextBox 20"/>
+          <p:cNvSpPr txBox="1"/>
+          <p:nvPr/>
+        </p:nvSpPr>
+        <p:spPr>
+          <a:xfrm>
+            <a:off x="6300192" y="5661248"/>
+            <a:ext cx="1152128" cy="369332"/>
+          </a:xfrm>
+          <a:prstGeom prst="rect">
+            <a:avLst/>
+          </a:prstGeom>
+          <a:noFill/>
+        </p:spPr>
+        <p:txBody>
+          <a:bodyPr wrap="square" rtlCol="0">
+            <a:spAutoFit/>
+          </a:bodyPr>
+          <a:lstStyle/>
+          <a:p>
+            <a:r>
+              <a:rPr lang="en-US" altLang="zh-CN" dirty="0" smtClean="0"/>
+              <a:t>stage3</a:t>
             </a:r>
             <a:endParaRPr lang="zh-CN" altLang="en-US" dirty="0"/>
           </a:p>

</xml_diff>